<commit_message>
Consistently use double-quotes for all JSON snippets
</commit_message>
<xml_diff>
--- a/papers/jon_mease/powerpoint/data_model_example.pptx
+++ b/papers/jon_mease/powerpoint/data_model_example.pptx
@@ -243,7 +243,7 @@
           <a:p>
             <a:fld id="{42C90B07-985A-2047-9BC7-9E0B0C92B340}" type="datetimeFigureOut">
               <a:rPr lang="en-US" smtClean="0"/>
-              <a:t>5/14/18</a:t>
+              <a:t>5/22/18</a:t>
             </a:fld>
             <a:endParaRPr lang="en-US"/>
           </a:p>
@@ -413,7 +413,7 @@
           <a:p>
             <a:fld id="{42C90B07-985A-2047-9BC7-9E0B0C92B340}" type="datetimeFigureOut">
               <a:rPr lang="en-US" smtClean="0"/>
-              <a:t>5/14/18</a:t>
+              <a:t>5/22/18</a:t>
             </a:fld>
             <a:endParaRPr lang="en-US"/>
           </a:p>
@@ -593,7 +593,7 @@
           <a:p>
             <a:fld id="{42C90B07-985A-2047-9BC7-9E0B0C92B340}" type="datetimeFigureOut">
               <a:rPr lang="en-US" smtClean="0"/>
-              <a:t>5/14/18</a:t>
+              <a:t>5/22/18</a:t>
             </a:fld>
             <a:endParaRPr lang="en-US"/>
           </a:p>
@@ -763,7 +763,7 @@
           <a:p>
             <a:fld id="{42C90B07-985A-2047-9BC7-9E0B0C92B340}" type="datetimeFigureOut">
               <a:rPr lang="en-US" smtClean="0"/>
-              <a:t>5/14/18</a:t>
+              <a:t>5/22/18</a:t>
             </a:fld>
             <a:endParaRPr lang="en-US"/>
           </a:p>
@@ -1007,7 +1007,7 @@
           <a:p>
             <a:fld id="{42C90B07-985A-2047-9BC7-9E0B0C92B340}" type="datetimeFigureOut">
               <a:rPr lang="en-US" smtClean="0"/>
-              <a:t>5/14/18</a:t>
+              <a:t>5/22/18</a:t>
             </a:fld>
             <a:endParaRPr lang="en-US"/>
           </a:p>
@@ -1239,7 +1239,7 @@
           <a:p>
             <a:fld id="{42C90B07-985A-2047-9BC7-9E0B0C92B340}" type="datetimeFigureOut">
               <a:rPr lang="en-US" smtClean="0"/>
-              <a:t>5/14/18</a:t>
+              <a:t>5/22/18</a:t>
             </a:fld>
             <a:endParaRPr lang="en-US"/>
           </a:p>
@@ -1606,7 +1606,7 @@
           <a:p>
             <a:fld id="{42C90B07-985A-2047-9BC7-9E0B0C92B340}" type="datetimeFigureOut">
               <a:rPr lang="en-US" smtClean="0"/>
-              <a:t>5/14/18</a:t>
+              <a:t>5/22/18</a:t>
             </a:fld>
             <a:endParaRPr lang="en-US"/>
           </a:p>
@@ -1724,7 +1724,7 @@
           <a:p>
             <a:fld id="{42C90B07-985A-2047-9BC7-9E0B0C92B340}" type="datetimeFigureOut">
               <a:rPr lang="en-US" smtClean="0"/>
-              <a:t>5/14/18</a:t>
+              <a:t>5/22/18</a:t>
             </a:fld>
             <a:endParaRPr lang="en-US"/>
           </a:p>
@@ -1819,7 +1819,7 @@
           <a:p>
             <a:fld id="{42C90B07-985A-2047-9BC7-9E0B0C92B340}" type="datetimeFigureOut">
               <a:rPr lang="en-US" smtClean="0"/>
-              <a:t>5/14/18</a:t>
+              <a:t>5/22/18</a:t>
             </a:fld>
             <a:endParaRPr lang="en-US"/>
           </a:p>
@@ -2096,7 +2096,7 @@
           <a:p>
             <a:fld id="{42C90B07-985A-2047-9BC7-9E0B0C92B340}" type="datetimeFigureOut">
               <a:rPr lang="en-US" smtClean="0"/>
-              <a:t>5/14/18</a:t>
+              <a:t>5/22/18</a:t>
             </a:fld>
             <a:endParaRPr lang="en-US"/>
           </a:p>
@@ -2353,7 +2353,7 @@
           <a:p>
             <a:fld id="{42C90B07-985A-2047-9BC7-9E0B0C92B340}" type="datetimeFigureOut">
               <a:rPr lang="en-US" smtClean="0"/>
-              <a:t>5/14/18</a:t>
+              <a:t>5/22/18</a:t>
             </a:fld>
             <a:endParaRPr lang="en-US"/>
           </a:p>
@@ -2566,7 +2566,7 @@
           <a:p>
             <a:fld id="{42C90B07-985A-2047-9BC7-9E0B0C92B340}" type="datetimeFigureOut">
               <a:rPr lang="en-US" smtClean="0"/>
-              <a:t>5/14/18</a:t>
+              <a:t>5/22/18</a:t>
             </a:fld>
             <a:endParaRPr lang="en-US"/>
           </a:p>
@@ -3034,7 +3034,7 @@
                 <a:ea typeface="Menlo" panose="020B0609030804020204" pitchFamily="49" charset="0"/>
                 <a:cs typeface="Courier New" panose="02070309020205020404" pitchFamily="49" charset="0"/>
               </a:rPr>
-              <a:t>{'data': [</a:t>
+              <a:t>{"data": [</a:t>
             </a:r>
             <a:br>
               <a:rPr lang="en-US" sz="800" dirty="0">
@@ -3049,7 +3049,7 @@
                 <a:ea typeface="Menlo" panose="020B0609030804020204" pitchFamily="49" charset="0"/>
                 <a:cs typeface="Courier New" panose="02070309020205020404" pitchFamily="49" charset="0"/>
               </a:rPr>
-              <a:t>    {'type': 'bar',</a:t>
+              <a:t>    {"type": "bar",</a:t>
             </a:r>
             <a:br>
               <a:rPr lang="en-US" sz="800" dirty="0">
@@ -3064,7 +3064,7 @@
                 <a:ea typeface="Menlo" panose="020B0609030804020204" pitchFamily="49" charset="0"/>
                 <a:cs typeface="Courier New" panose="02070309020205020404" pitchFamily="49" charset="0"/>
               </a:rPr>
-              <a:t>     'y': [2, 3, 1],</a:t>
+              <a:t>     "y": [2, 3, 1],</a:t>
             </a:r>
             <a:br>
               <a:rPr lang="en-US" sz="800" dirty="0">
@@ -3079,7 +3079,7 @@
                 <a:ea typeface="Menlo" panose="020B0609030804020204" pitchFamily="49" charset="0"/>
                 <a:cs typeface="Courier New" panose="02070309020205020404" pitchFamily="49" charset="0"/>
               </a:rPr>
-              <a:t>     'name': 'A',},</a:t>
+              <a:t>     "name": "A",},</a:t>
             </a:r>
             <a:br>
               <a:rPr lang="en-US" sz="800" dirty="0">
@@ -3094,7 +3094,7 @@
                 <a:ea typeface="Menlo" panose="020B0609030804020204" pitchFamily="49" charset="0"/>
                 <a:cs typeface="Courier New" panose="02070309020205020404" pitchFamily="49" charset="0"/>
               </a:rPr>
-              <a:t>    {'type': 'scatter',</a:t>
+              <a:t>    {"type": "scatter",</a:t>
             </a:r>
             <a:br>
               <a:rPr lang="en-US" sz="800" dirty="0">
@@ -3109,7 +3109,7 @@
                 <a:ea typeface="Menlo" panose="020B0609030804020204" pitchFamily="49" charset="0"/>
                 <a:cs typeface="Courier New" panose="02070309020205020404" pitchFamily="49" charset="0"/>
               </a:rPr>
-              <a:t>     'y': [3, 1, 2],</a:t>
+              <a:t>     "y": [3, 1, 2],</a:t>
             </a:r>
             <a:br>
               <a:rPr lang="en-US" sz="800" dirty="0">
@@ -3124,7 +3124,7 @@
                 <a:ea typeface="Menlo" panose="020B0609030804020204" pitchFamily="49" charset="0"/>
                 <a:cs typeface="Courier New" panose="02070309020205020404" pitchFamily="49" charset="0"/>
               </a:rPr>
-              <a:t>     'name': 'B',</a:t>
+              <a:t>     "name": "B",</a:t>
             </a:r>
             <a:br>
               <a:rPr lang="en-US" sz="800" dirty="0">
@@ -3139,7 +3139,7 @@
                 <a:ea typeface="Menlo" panose="020B0609030804020204" pitchFamily="49" charset="0"/>
                 <a:cs typeface="Courier New" panose="02070309020205020404" pitchFamily="49" charset="0"/>
               </a:rPr>
-              <a:t>     'marker': {'size': 12}}</a:t>
+              <a:t>     "marker": {"size": 12}}</a:t>
             </a:r>
             <a:br>
               <a:rPr lang="en-US" sz="800" dirty="0">
@@ -3169,7 +3169,23 @@
                 <a:ea typeface="Menlo" panose="020B0609030804020204" pitchFamily="49" charset="0"/>
                 <a:cs typeface="Courier New" panose="02070309020205020404" pitchFamily="49" charset="0"/>
               </a:rPr>
-              <a:t>'layout': {'xaxis':</a:t>
+              <a:t>"layout": {"</a:t>
+            </a:r>
+            <a:r>
+              <a:rPr lang="en-US" sz="800" dirty="0" err="1">
+                <a:latin typeface="Courier New" panose="02070309020205020404" pitchFamily="49" charset="0"/>
+                <a:ea typeface="Menlo" panose="020B0609030804020204" pitchFamily="49" charset="0"/>
+                <a:cs typeface="Courier New" panose="02070309020205020404" pitchFamily="49" charset="0"/>
+              </a:rPr>
+              <a:t>xaxis</a:t>
+            </a:r>
+            <a:r>
+              <a:rPr lang="en-US" sz="800" dirty="0">
+                <a:latin typeface="Courier New" panose="02070309020205020404" pitchFamily="49" charset="0"/>
+                <a:ea typeface="Menlo" panose="020B0609030804020204" pitchFamily="49" charset="0"/>
+                <a:cs typeface="Courier New" panose="02070309020205020404" pitchFamily="49" charset="0"/>
+              </a:rPr>
+              <a:t>":</a:t>
             </a:r>
             <a:br>
               <a:rPr lang="en-US" sz="800" dirty="0">
@@ -3184,7 +3200,7 @@
                 <a:ea typeface="Menlo" panose="020B0609030804020204" pitchFamily="49" charset="0"/>
                 <a:cs typeface="Courier New" panose="02070309020205020404" pitchFamily="49" charset="0"/>
               </a:rPr>
-              <a:t>           {'range': [-1, 3],</a:t>
+              <a:t>           {"range": [-1, 3],</a:t>
             </a:r>
             <a:br>
               <a:rPr lang="en-US" sz="800" dirty="0">
@@ -3199,7 +3215,23 @@
                 <a:ea typeface="Menlo" panose="020B0609030804020204" pitchFamily="49" charset="0"/>
                 <a:cs typeface="Courier New" panose="02070309020205020404" pitchFamily="49" charset="0"/>
               </a:rPr>
-              <a:t>            'tickvals': [0, 1, 2]}}}</a:t>
+              <a:t>            "</a:t>
+            </a:r>
+            <a:r>
+              <a:rPr lang="en-US" sz="800" dirty="0" err="1">
+                <a:latin typeface="Courier New" panose="02070309020205020404" pitchFamily="49" charset="0"/>
+                <a:ea typeface="Menlo" panose="020B0609030804020204" pitchFamily="49" charset="0"/>
+                <a:cs typeface="Courier New" panose="02070309020205020404" pitchFamily="49" charset="0"/>
+              </a:rPr>
+              <a:t>tickvals</a:t>
+            </a:r>
+            <a:r>
+              <a:rPr lang="en-US" sz="800" dirty="0">
+                <a:latin typeface="Courier New" panose="02070309020205020404" pitchFamily="49" charset="0"/>
+                <a:ea typeface="Menlo" panose="020B0609030804020204" pitchFamily="49" charset="0"/>
+                <a:cs typeface="Courier New" panose="02070309020205020404" pitchFamily="49" charset="0"/>
+              </a:rPr>
+              <a:t>": [0, 1, 2]}}}</a:t>
             </a:r>
           </a:p>
         </p:txBody>

</xml_diff>